<commit_message>
Chap01: Passed to floatbox caption.
</commit_message>
<xml_diff>
--- a/01-QD/Pictures/AFMQD.pptx
+++ b/01-QD/Pictures/AFMQD.pptx
@@ -7,7 +7,7 @@
   <p:sldIdLst>
     <p:sldId id="256" r:id="rId2"/>
   </p:sldIdLst>
-  <p:sldSz cx="5400675" cy="3060700"/>
+  <p:sldSz cx="6121400" cy="3060700"/>
   <p:notesSz cx="6858000" cy="9144000"/>
   <p:defaultTextStyle>
     <a:defPPr>
@@ -136,8 +136,8 @@
         </p:nvSpPr>
         <p:spPr>
           <a:xfrm>
-            <a:off x="405051" y="950801"/>
-            <a:ext cx="4590574" cy="656067"/>
+            <a:off x="459106" y="950802"/>
+            <a:ext cx="5203190" cy="656067"/>
           </a:xfrm>
         </p:spPr>
         <p:txBody>
@@ -164,8 +164,8 @@
         </p:nvSpPr>
         <p:spPr>
           <a:xfrm>
-            <a:off x="810101" y="1734397"/>
-            <a:ext cx="3780473" cy="782179"/>
+            <a:off x="918210" y="1734398"/>
+            <a:ext cx="4284981" cy="782179"/>
           </a:xfrm>
         </p:spPr>
         <p:txBody>
@@ -288,7 +288,7 @@
           <a:p>
             <a:fld id="{AB83A7AC-BA5E-4C82-8BF5-52AF0EA4B3B4}" type="datetimeFigureOut">
               <a:rPr lang="fr-FR" smtClean="0"/>
-              <a:t>29/06/2017</a:t>
+              <a:t>03/07/2017</a:t>
             </a:fld>
             <a:endParaRPr lang="fr-FR"/>
           </a:p>
@@ -458,7 +458,7 @@
           <a:p>
             <a:fld id="{AB83A7AC-BA5E-4C82-8BF5-52AF0EA4B3B4}" type="datetimeFigureOut">
               <a:rPr lang="fr-FR" smtClean="0"/>
-              <a:t>29/06/2017</a:t>
+              <a:t>03/07/2017</a:t>
             </a:fld>
             <a:endParaRPr lang="fr-FR"/>
           </a:p>
@@ -548,8 +548,8 @@
         </p:nvSpPr>
         <p:spPr>
           <a:xfrm>
-            <a:off x="2313102" y="54554"/>
-            <a:ext cx="717277" cy="1165475"/>
+            <a:off x="2621788" y="54555"/>
+            <a:ext cx="812998" cy="1165475"/>
           </a:xfrm>
         </p:spPr>
         <p:txBody>
@@ -576,8 +576,8 @@
         </p:nvSpPr>
         <p:spPr>
           <a:xfrm>
-            <a:off x="159395" y="54554"/>
-            <a:ext cx="2063696" cy="1165475"/>
+            <a:off x="180666" y="54555"/>
+            <a:ext cx="2339098" cy="1165475"/>
           </a:xfrm>
         </p:spPr>
         <p:txBody>
@@ -638,7 +638,7 @@
           <a:p>
             <a:fld id="{AB83A7AC-BA5E-4C82-8BF5-52AF0EA4B3B4}" type="datetimeFigureOut">
               <a:rPr lang="fr-FR" smtClean="0"/>
-              <a:t>29/06/2017</a:t>
+              <a:t>03/07/2017</a:t>
             </a:fld>
             <a:endParaRPr lang="fr-FR"/>
           </a:p>
@@ -808,7 +808,7 @@
           <a:p>
             <a:fld id="{AB83A7AC-BA5E-4C82-8BF5-52AF0EA4B3B4}" type="datetimeFigureOut">
               <a:rPr lang="fr-FR" smtClean="0"/>
-              <a:t>29/06/2017</a:t>
+              <a:t>03/07/2017</a:t>
             </a:fld>
             <a:endParaRPr lang="fr-FR"/>
           </a:p>
@@ -898,8 +898,8 @@
         </p:nvSpPr>
         <p:spPr>
           <a:xfrm>
-            <a:off x="426616" y="1966783"/>
-            <a:ext cx="4590574" cy="607889"/>
+            <a:off x="483548" y="1966784"/>
+            <a:ext cx="5203190" cy="607889"/>
           </a:xfrm>
         </p:spPr>
         <p:txBody>
@@ -930,8 +930,8 @@
         </p:nvSpPr>
         <p:spPr>
           <a:xfrm>
-            <a:off x="426616" y="1297255"/>
-            <a:ext cx="4590574" cy="669528"/>
+            <a:off x="483548" y="1297255"/>
+            <a:ext cx="5203190" cy="669528"/>
           </a:xfrm>
         </p:spPr>
         <p:txBody>
@@ -1054,7 +1054,7 @@
           <a:p>
             <a:fld id="{AB83A7AC-BA5E-4C82-8BF5-52AF0EA4B3B4}" type="datetimeFigureOut">
               <a:rPr lang="fr-FR" smtClean="0"/>
-              <a:t>29/06/2017</a:t>
+              <a:t>03/07/2017</a:t>
             </a:fld>
             <a:endParaRPr lang="fr-FR"/>
           </a:p>
@@ -1167,8 +1167,8 @@
         </p:nvSpPr>
         <p:spPr>
           <a:xfrm>
-            <a:off x="159395" y="318823"/>
-            <a:ext cx="1390487" cy="901206"/>
+            <a:off x="180667" y="318823"/>
+            <a:ext cx="1576049" cy="901206"/>
           </a:xfrm>
         </p:spPr>
         <p:txBody>
@@ -1252,8 +1252,8 @@
         </p:nvSpPr>
         <p:spPr>
           <a:xfrm>
-            <a:off x="1639893" y="318823"/>
-            <a:ext cx="1390486" cy="901206"/>
+            <a:off x="1858738" y="318823"/>
+            <a:ext cx="1576048" cy="901206"/>
           </a:xfrm>
         </p:spPr>
         <p:txBody>
@@ -1342,7 +1342,7 @@
           <a:p>
             <a:fld id="{AB83A7AC-BA5E-4C82-8BF5-52AF0EA4B3B4}" type="datetimeFigureOut">
               <a:rPr lang="fr-FR" smtClean="0"/>
-              <a:t>29/06/2017</a:t>
+              <a:t>03/07/2017</a:t>
             </a:fld>
             <a:endParaRPr lang="fr-FR"/>
           </a:p>
@@ -1432,8 +1432,8 @@
         </p:nvSpPr>
         <p:spPr>
           <a:xfrm>
-            <a:off x="270034" y="122570"/>
-            <a:ext cx="4860608" cy="510117"/>
+            <a:off x="306070" y="122571"/>
+            <a:ext cx="5509261" cy="510117"/>
           </a:xfrm>
         </p:spPr>
         <p:txBody>
@@ -1464,8 +1464,8 @@
         </p:nvSpPr>
         <p:spPr>
           <a:xfrm>
-            <a:off x="270034" y="685115"/>
-            <a:ext cx="2386236" cy="285523"/>
+            <a:off x="306070" y="685115"/>
+            <a:ext cx="2704681" cy="285523"/>
           </a:xfrm>
         </p:spPr>
         <p:txBody>
@@ -1529,8 +1529,8 @@
         </p:nvSpPr>
         <p:spPr>
           <a:xfrm>
-            <a:off x="270034" y="970639"/>
-            <a:ext cx="2386236" cy="1763445"/>
+            <a:off x="306070" y="970640"/>
+            <a:ext cx="2704681" cy="1763445"/>
           </a:xfrm>
         </p:spPr>
         <p:txBody>
@@ -1614,8 +1614,8 @@
         </p:nvSpPr>
         <p:spPr>
           <a:xfrm>
-            <a:off x="2743468" y="685115"/>
-            <a:ext cx="2387173" cy="285523"/>
+            <a:off x="3109587" y="685115"/>
+            <a:ext cx="2705743" cy="285523"/>
           </a:xfrm>
         </p:spPr>
         <p:txBody>
@@ -1679,8 +1679,8 @@
         </p:nvSpPr>
         <p:spPr>
           <a:xfrm>
-            <a:off x="2743468" y="970639"/>
-            <a:ext cx="2387173" cy="1763445"/>
+            <a:off x="3109587" y="970640"/>
+            <a:ext cx="2705743" cy="1763445"/>
           </a:xfrm>
         </p:spPr>
         <p:txBody>
@@ -1769,7 +1769,7 @@
           <a:p>
             <a:fld id="{AB83A7AC-BA5E-4C82-8BF5-52AF0EA4B3B4}" type="datetimeFigureOut">
               <a:rPr lang="fr-FR" smtClean="0"/>
-              <a:t>29/06/2017</a:t>
+              <a:t>03/07/2017</a:t>
             </a:fld>
             <a:endParaRPr lang="fr-FR"/>
           </a:p>
@@ -1887,7 +1887,7 @@
           <a:p>
             <a:fld id="{AB83A7AC-BA5E-4C82-8BF5-52AF0EA4B3B4}" type="datetimeFigureOut">
               <a:rPr lang="fr-FR" smtClean="0"/>
-              <a:t>29/06/2017</a:t>
+              <a:t>03/07/2017</a:t>
             </a:fld>
             <a:endParaRPr lang="fr-FR"/>
           </a:p>
@@ -1982,7 +1982,7 @@
           <a:p>
             <a:fld id="{AB83A7AC-BA5E-4C82-8BF5-52AF0EA4B3B4}" type="datetimeFigureOut">
               <a:rPr lang="fr-FR" smtClean="0"/>
-              <a:t>29/06/2017</a:t>
+              <a:t>03/07/2017</a:t>
             </a:fld>
             <a:endParaRPr lang="fr-FR"/>
           </a:p>
@@ -2072,8 +2072,8 @@
         </p:nvSpPr>
         <p:spPr>
           <a:xfrm>
-            <a:off x="270034" y="121861"/>
-            <a:ext cx="1776785" cy="518619"/>
+            <a:off x="306071" y="121862"/>
+            <a:ext cx="2013899" cy="518619"/>
           </a:xfrm>
         </p:spPr>
         <p:txBody>
@@ -2104,8 +2104,8 @@
         </p:nvSpPr>
         <p:spPr>
           <a:xfrm>
-            <a:off x="2111514" y="121861"/>
-            <a:ext cx="3019127" cy="2612223"/>
+            <a:off x="2393298" y="121862"/>
+            <a:ext cx="3422032" cy="2612223"/>
           </a:xfrm>
         </p:spPr>
         <p:txBody>
@@ -2189,8 +2189,8 @@
         </p:nvSpPr>
         <p:spPr>
           <a:xfrm>
-            <a:off x="270034" y="640480"/>
-            <a:ext cx="1776785" cy="2093604"/>
+            <a:off x="306071" y="640480"/>
+            <a:ext cx="2013899" cy="2093604"/>
           </a:xfrm>
         </p:spPr>
         <p:txBody>
@@ -2259,7 +2259,7 @@
           <a:p>
             <a:fld id="{AB83A7AC-BA5E-4C82-8BF5-52AF0EA4B3B4}" type="datetimeFigureOut">
               <a:rPr lang="fr-FR" smtClean="0"/>
-              <a:t>29/06/2017</a:t>
+              <a:t>03/07/2017</a:t>
             </a:fld>
             <a:endParaRPr lang="fr-FR"/>
           </a:p>
@@ -2349,8 +2349,8 @@
         </p:nvSpPr>
         <p:spPr>
           <a:xfrm>
-            <a:off x="1058570" y="2142490"/>
-            <a:ext cx="3240405" cy="252933"/>
+            <a:off x="1199838" y="2142491"/>
+            <a:ext cx="3672840" cy="252933"/>
           </a:xfrm>
         </p:spPr>
         <p:txBody>
@@ -2381,8 +2381,8 @@
         </p:nvSpPr>
         <p:spPr>
           <a:xfrm>
-            <a:off x="1058570" y="273479"/>
-            <a:ext cx="3240405" cy="1836420"/>
+            <a:off x="1199838" y="273479"/>
+            <a:ext cx="3672840" cy="1836420"/>
           </a:xfrm>
         </p:spPr>
         <p:txBody>
@@ -2442,8 +2442,8 @@
         </p:nvSpPr>
         <p:spPr>
           <a:xfrm>
-            <a:off x="1058570" y="2395423"/>
-            <a:ext cx="3240405" cy="359207"/>
+            <a:off x="1199838" y="2395424"/>
+            <a:ext cx="3672840" cy="359207"/>
           </a:xfrm>
         </p:spPr>
         <p:txBody>
@@ -2512,7 +2512,7 @@
           <a:p>
             <a:fld id="{AB83A7AC-BA5E-4C82-8BF5-52AF0EA4B3B4}" type="datetimeFigureOut">
               <a:rPr lang="fr-FR" smtClean="0"/>
-              <a:t>29/06/2017</a:t>
+              <a:t>03/07/2017</a:t>
             </a:fld>
             <a:endParaRPr lang="fr-FR"/>
           </a:p>
@@ -2607,8 +2607,8 @@
         </p:nvSpPr>
         <p:spPr>
           <a:xfrm>
-            <a:off x="270034" y="122570"/>
-            <a:ext cx="4860608" cy="510117"/>
+            <a:off x="306070" y="122571"/>
+            <a:ext cx="5509261" cy="510117"/>
           </a:xfrm>
           <a:prstGeom prst="rect">
             <a:avLst/>
@@ -2640,8 +2640,8 @@
         </p:nvSpPr>
         <p:spPr>
           <a:xfrm>
-            <a:off x="270034" y="714163"/>
-            <a:ext cx="4860608" cy="2019921"/>
+            <a:off x="306070" y="714164"/>
+            <a:ext cx="5509261" cy="2019921"/>
           </a:xfrm>
           <a:prstGeom prst="rect">
             <a:avLst/>
@@ -2702,8 +2702,8 @@
         </p:nvSpPr>
         <p:spPr>
           <a:xfrm>
-            <a:off x="270034" y="2836816"/>
-            <a:ext cx="1260158" cy="162954"/>
+            <a:off x="306070" y="2836816"/>
+            <a:ext cx="1428327" cy="162954"/>
           </a:xfrm>
           <a:prstGeom prst="rect">
             <a:avLst/>
@@ -2725,7 +2725,7 @@
           <a:p>
             <a:fld id="{AB83A7AC-BA5E-4C82-8BF5-52AF0EA4B3B4}" type="datetimeFigureOut">
               <a:rPr lang="fr-FR" smtClean="0"/>
-              <a:t>29/06/2017</a:t>
+              <a:t>03/07/2017</a:t>
             </a:fld>
             <a:endParaRPr lang="fr-FR"/>
           </a:p>
@@ -2743,8 +2743,8 @@
         </p:nvSpPr>
         <p:spPr>
           <a:xfrm>
-            <a:off x="1845231" y="2836816"/>
-            <a:ext cx="1710214" cy="162954"/>
+            <a:off x="2091479" y="2836816"/>
+            <a:ext cx="1938444" cy="162954"/>
           </a:xfrm>
           <a:prstGeom prst="rect">
             <a:avLst/>
@@ -2780,8 +2780,8 @@
         </p:nvSpPr>
         <p:spPr>
           <a:xfrm>
-            <a:off x="3870484" y="2836816"/>
-            <a:ext cx="1260158" cy="162954"/>
+            <a:off x="4387004" y="2836816"/>
+            <a:ext cx="1428327" cy="162954"/>
           </a:xfrm>
           <a:prstGeom prst="rect">
             <a:avLst/>
@@ -3102,7 +3102,7 @@
       </p:grpSpPr>
       <p:pic>
         <p:nvPicPr>
-          <p:cNvPr id="5" name="Picture 2"/>
+          <p:cNvPr id="4" name="Picture 2"/>
           <p:cNvPicPr>
             <a:picLocks noChangeAspect="1" noChangeArrowheads="1"/>
           </p:cNvPicPr>

</xml_diff>